<commit_message>
deployment instruction has been added
</commit_message>
<xml_diff>
--- a/presentation.pptx
+++ b/presentation.pptx
@@ -11,6 +11,10 @@
     <p:sldId id="259" r:id="rId10"/>
     <p:sldId id="260" r:id="rId11"/>
     <p:sldId id="261" r:id="rId12"/>
+    <p:sldId id="262" r:id="rId13"/>
+    <p:sldId id="263" r:id="rId14"/>
+    <p:sldId id="264" r:id="rId15"/>
+    <p:sldId id="265" r:id="rId16"/>
   </p:sldIdLst>
   <p:sldSz cx="9144000" cy="6858000" type="screen4x3"/>
   <p:notesSz cx="6858000" cy="9144000"/>
@@ -3143,6 +3147,7 @@
               <a:t>Группа: P4150</a:t>
             </a:r>
           </a:p>
+          <a:p/>
           <a:p>
             <a:r>
               <a:t>Студент: Соснов Андрей Николаевич</a:t>
@@ -3151,6 +3156,86 @@
           <a:p>
             <a:r>
               <a:t>Санкт-Петербург, 2025 г.</a:t>
+            </a:r>
+          </a:p>
+        </p:txBody>
+      </p:sp>
+    </p:spTree>
+  </p:cSld>
+  <p:clrMapOvr>
+    <a:masterClrMapping/>
+  </p:clrMapOvr>
+</p:sld>
+</file>
+
+<file path=ppt/slides/slide10.xml><?xml version="1.0" encoding="utf-8"?>
+<p:sld xmlns:a="http://schemas.openxmlformats.org/drawingml/2006/main" xmlns:p="http://schemas.openxmlformats.org/presentationml/2006/main" xmlns:r="http://schemas.openxmlformats.org/officeDocument/2006/relationships">
+  <p:cSld>
+    <p:spTree>
+      <p:nvGrpSpPr>
+        <p:cNvPr id="1" name=""/>
+        <p:cNvGrpSpPr/>
+        <p:nvPr/>
+      </p:nvGrpSpPr>
+      <p:grpSpPr/>
+      <p:sp>
+        <p:nvSpPr>
+          <p:cNvPr id="2" name="Title 1"/>
+          <p:cNvSpPr>
+            <a:spLocks noGrp="1"/>
+          </p:cNvSpPr>
+          <p:nvPr>
+            <p:ph type="title"/>
+          </p:nvPr>
+        </p:nvSpPr>
+        <p:spPr/>
+        <p:txBody>
+          <a:bodyPr/>
+          <a:lstStyle/>
+          <a:p>
+            <a:r>
+              <a:t>Контактная информация</a:t>
+            </a:r>
+          </a:p>
+        </p:txBody>
+      </p:sp>
+      <p:sp>
+        <p:nvSpPr>
+          <p:cNvPr id="3" name="Content Placeholder 2"/>
+          <p:cNvSpPr>
+            <a:spLocks noGrp="1"/>
+          </p:cNvSpPr>
+          <p:nvPr>
+            <p:ph idx="1"/>
+          </p:nvPr>
+        </p:nvSpPr>
+        <p:spPr/>
+        <p:txBody>
+          <a:bodyPr/>
+          <a:lstStyle/>
+          <a:p>
+            <a:r>
+              <a:rPr sz="2000" b="0">
+                <a:latin typeface="Arial"/>
+              </a:rPr>
+              <a:t>Андрей Соснов</a:t>
+            </a:r>
+          </a:p>
+          <a:p/>
+          <a:p>
+            <a:r>
+              <a:rPr sz="2000" b="0">
+                <a:latin typeface="Arial"/>
+              </a:rPr>
+              <a:t>Тел.: +7 953 410 33 69</a:t>
+            </a:r>
+          </a:p>
+          <a:p>
+            <a:r>
+              <a:rPr sz="2000" b="0">
+                <a:latin typeface="Arial"/>
+              </a:rPr>
+              <a:t>E-mail: andreysosnoff@gmail.com</a:t>
             </a:r>
           </a:p>
         </p:txBody>
@@ -3189,7 +3274,7 @@
           <a:lstStyle/>
           <a:p>
             <a:r>
-              <a:t>Цель проекта</a:t>
+              <a:t>Решаемая проблема</a:t>
             </a:r>
           </a:p>
         </p:txBody>
@@ -3210,12 +3295,10 @@
           <a:lstStyle/>
           <a:p>
             <a:r>
-              <a:t>Создание простого веб-интерфейса для общения с локальной языковой моделью через Ollama,</a:t>
-            </a:r>
-          </a:p>
-          <a:p>
-            <a:r>
-              <a:t>без необходимости использовать командную строку.</a:t>
+              <a:rPr sz="2000" b="0">
+                <a:latin typeface="Arial"/>
+              </a:rPr>
+              <a:t>Создание приложения для удобного доступа к локальным большим языковым моделям с простым интерфейсом, особенно для пользователей экранных дикторов.</a:t>
             </a:r>
           </a:p>
         </p:txBody>
@@ -3254,7 +3337,7 @@
           <a:lstStyle/>
           <a:p>
             <a:r>
-              <a:t>Основные задачи</a:t>
+              <a:t>Цель проекта</a:t>
             </a:r>
           </a:p>
         </p:txBody>
@@ -3275,27 +3358,18 @@
           <a:lstStyle/>
           <a:p>
             <a:r>
-              <a:t>Разграничение доступа пользователей (по логину и паролю)</a:t>
-            </a:r>
-          </a:p>
-          <a:p>
-            <a:r>
-              <a:t>Создание интерфейса чата</a:t>
-            </a:r>
-          </a:p>
-          <a:p>
-            <a:r>
-              <a:t>Интеграция с локальным Ollama API</a:t>
-            </a:r>
-          </a:p>
-          <a:p>
-            <a:r>
-              <a:t>Отображение ответов LLM</a:t>
-            </a:r>
-          </a:p>
-          <a:p>
-            <a:r>
-              <a:t>Возможность быстрого копирования ответов</a:t>
+              <a:rPr sz="2000" b="0">
+                <a:latin typeface="Arial"/>
+              </a:rPr>
+              <a:t>Цель:</a:t>
+            </a:r>
+          </a:p>
+          <a:p>
+            <a:r>
+              <a:rPr sz="2000" b="0">
+                <a:latin typeface="Arial"/>
+              </a:rPr>
+              <a:t>Создание простого веб-интерфейса для общения с локальной языковой моделью через Ollama, без необходимости использовать командную строку.</a:t>
             </a:r>
           </a:p>
         </p:txBody>
@@ -3334,7 +3408,7 @@
           <a:lstStyle/>
           <a:p>
             <a:r>
-              <a:t>Архитектура приложения</a:t>
+              <a:t>Основные задачи</a:t>
             </a:r>
           </a:p>
         </p:txBody>
@@ -3355,27 +3429,42 @@
           <a:lstStyle/>
           <a:p>
             <a:r>
-              <a:t>Фронтенд: HTML + JavaScript</a:t>
-            </a:r>
-          </a:p>
-          <a:p>
-            <a:r>
-              <a:t>Бэкенд: Flask (Python)</a:t>
-            </a:r>
-          </a:p>
-          <a:p>
-            <a:r>
-              <a:t>LLM: локальный Ollama API</a:t>
-            </a:r>
-          </a:p>
-          <a:p>
-            <a:r>
-              <a:t>Протокол взаимодействия: HTTP (POST-запросы)</a:t>
-            </a:r>
-          </a:p>
-          <a:p>
-            <a:r>
-              <a:t>Выбор модели LLM: конфигурируется на сервере</a:t>
+              <a:rPr sz="2000" b="0">
+                <a:latin typeface="Arial"/>
+              </a:rPr>
+              <a:t>* Разграничение доступа пользователей (по логину и паролю)</a:t>
+            </a:r>
+          </a:p>
+          <a:p>
+            <a:r>
+              <a:rPr sz="2000" b="0">
+                <a:latin typeface="Arial"/>
+              </a:rPr>
+              <a:t>* Создание интерфейса чата</a:t>
+            </a:r>
+          </a:p>
+          <a:p>
+            <a:r>
+              <a:rPr sz="2000" b="0">
+                <a:latin typeface="Arial"/>
+              </a:rPr>
+              <a:t>* Интеграция с локальным Ollama API</a:t>
+            </a:r>
+          </a:p>
+          <a:p>
+            <a:r>
+              <a:rPr sz="2000" b="0">
+                <a:latin typeface="Arial"/>
+              </a:rPr>
+              <a:t>* Отображение ответов LLM</a:t>
+            </a:r>
+          </a:p>
+          <a:p>
+            <a:r>
+              <a:rPr sz="2000" b="0">
+                <a:latin typeface="Arial"/>
+              </a:rPr>
+              <a:t>* Возможность быстрого копирования ответов</a:t>
             </a:r>
           </a:p>
         </p:txBody>
@@ -3414,7 +3503,7 @@
           <a:lstStyle/>
           <a:p>
             <a:r>
-              <a:t>Функциональные возможности</a:t>
+              <a:t>Архитектура приложения</a:t>
             </a:r>
           </a:p>
         </p:txBody>
@@ -3435,27 +3524,51 @@
           <a:lstStyle/>
           <a:p>
             <a:r>
-              <a:t>Вход по email и паролю</a:t>
-            </a:r>
-          </a:p>
-          <a:p>
-            <a:r>
-              <a:t>Отправка текстового запроса</a:t>
-            </a:r>
-          </a:p>
-          <a:p>
-            <a:r>
-              <a:t>Отображение чата с подписями "User" / "LLAMA2"</a:t>
-            </a:r>
-          </a:p>
-          <a:p>
-            <a:r>
-              <a:t>Обработка ошибок (недоступность API)</a:t>
-            </a:r>
-          </a:p>
-          <a:p>
-            <a:r>
-              <a:t>Кнопка "Копировать" возле каждого ответа</a:t>
+              <a:rPr sz="2000" b="0">
+                <a:latin typeface="Arial"/>
+              </a:rPr>
+              <a:t>Компоненты:</a:t>
+            </a:r>
+          </a:p>
+          <a:p/>
+          <a:p>
+            <a:r>
+              <a:rPr sz="2000" b="0">
+                <a:latin typeface="Arial"/>
+              </a:rPr>
+              <a:t>* Фронтенд: HTML + JavaScript</a:t>
+            </a:r>
+          </a:p>
+          <a:p>
+            <a:r>
+              <a:rPr sz="2000" b="0">
+                <a:latin typeface="Arial"/>
+              </a:rPr>
+              <a:t>* Бэкенд: Flask (Python)</a:t>
+            </a:r>
+          </a:p>
+          <a:p>
+            <a:r>
+              <a:rPr sz="2000" b="0">
+                <a:latin typeface="Arial"/>
+              </a:rPr>
+              <a:t>* LLM: локальный Ollama API</a:t>
+            </a:r>
+          </a:p>
+          <a:p>
+            <a:r>
+              <a:rPr sz="2000" b="0">
+                <a:latin typeface="Arial"/>
+              </a:rPr>
+              <a:t>  Протокол взаимодействия: HTTP (POST-запросы)</a:t>
+            </a:r>
+          </a:p>
+          <a:p>
+            <a:r>
+              <a:rPr sz="2000" b="0">
+                <a:latin typeface="Arial"/>
+              </a:rPr>
+              <a:t>  Выбор модели LLM: конфигурируется на сервере</a:t>
             </a:r>
           </a:p>
         </p:txBody>
@@ -3494,6 +3607,316 @@
           <a:lstStyle/>
           <a:p>
             <a:r>
+              <a:t>Функциональные возможности</a:t>
+            </a:r>
+          </a:p>
+        </p:txBody>
+      </p:sp>
+      <p:sp>
+        <p:nvSpPr>
+          <p:cNvPr id="3" name="Content Placeholder 2"/>
+          <p:cNvSpPr>
+            <a:spLocks noGrp="1"/>
+          </p:cNvSpPr>
+          <p:nvPr>
+            <p:ph idx="1"/>
+          </p:nvPr>
+        </p:nvSpPr>
+        <p:spPr/>
+        <p:txBody>
+          <a:bodyPr/>
+          <a:lstStyle/>
+          <a:p>
+            <a:r>
+              <a:rPr sz="2000" b="0">
+                <a:latin typeface="Arial"/>
+              </a:rPr>
+              <a:t>* Вход по email и паролю</a:t>
+            </a:r>
+          </a:p>
+          <a:p>
+            <a:r>
+              <a:rPr sz="2000" b="0">
+                <a:latin typeface="Arial"/>
+              </a:rPr>
+              <a:t>* Отправка текстового запроса</a:t>
+            </a:r>
+          </a:p>
+          <a:p>
+            <a:r>
+              <a:rPr sz="2000" b="0">
+                <a:latin typeface="Arial"/>
+              </a:rPr>
+              <a:t>* Отображение чата с подписями "User" / "LLAMA2"</a:t>
+            </a:r>
+          </a:p>
+          <a:p>
+            <a:r>
+              <a:rPr sz="2000" b="0">
+                <a:latin typeface="Arial"/>
+              </a:rPr>
+              <a:t>* Обработка ошибок (недоступность API)</a:t>
+            </a:r>
+          </a:p>
+          <a:p>
+            <a:r>
+              <a:rPr sz="2000" b="0">
+                <a:latin typeface="Arial"/>
+              </a:rPr>
+              <a:t>* Кнопка "Копировать" возле каждого ответа</a:t>
+            </a:r>
+          </a:p>
+        </p:txBody>
+      </p:sp>
+    </p:spTree>
+  </p:cSld>
+  <p:clrMapOvr>
+    <a:masterClrMapping/>
+  </p:clrMapOvr>
+</p:sld>
+</file>
+
+<file path=ppt/slides/slide7.xml><?xml version="1.0" encoding="utf-8"?>
+<p:sld xmlns:a="http://schemas.openxmlformats.org/drawingml/2006/main" xmlns:p="http://schemas.openxmlformats.org/presentationml/2006/main" xmlns:r="http://schemas.openxmlformats.org/officeDocument/2006/relationships">
+  <p:cSld>
+    <p:spTree>
+      <p:nvGrpSpPr>
+        <p:cNvPr id="1" name=""/>
+        <p:cNvGrpSpPr/>
+        <p:nvPr/>
+      </p:nvGrpSpPr>
+      <p:grpSpPr/>
+      <p:sp>
+        <p:nvSpPr>
+          <p:cNvPr id="2" name="Title 1"/>
+          <p:cNvSpPr>
+            <a:spLocks noGrp="1"/>
+          </p:cNvSpPr>
+          <p:nvPr>
+            <p:ph type="title"/>
+          </p:nvPr>
+        </p:nvSpPr>
+        <p:spPr/>
+        <p:txBody>
+          <a:bodyPr/>
+          <a:lstStyle/>
+          <a:p>
+            <a:r>
+              <a:t>Сценарий использования</a:t>
+            </a:r>
+          </a:p>
+        </p:txBody>
+      </p:sp>
+      <p:sp>
+        <p:nvSpPr>
+          <p:cNvPr id="3" name="Content Placeholder 2"/>
+          <p:cNvSpPr>
+            <a:spLocks noGrp="1"/>
+          </p:cNvSpPr>
+          <p:nvPr>
+            <p:ph idx="1"/>
+          </p:nvPr>
+        </p:nvSpPr>
+        <p:spPr/>
+        <p:txBody>
+          <a:bodyPr/>
+          <a:lstStyle/>
+          <a:p>
+            <a:r>
+              <a:rPr sz="2000" b="0">
+                <a:latin typeface="Arial"/>
+              </a:rPr>
+              <a:t>Пользователь:</a:t>
+            </a:r>
+          </a:p>
+          <a:p>
+            <a:r>
+              <a:rPr sz="2000" b="0">
+                <a:latin typeface="Arial"/>
+              </a:rPr>
+              <a:t>→ Входит в систему</a:t>
+            </a:r>
+          </a:p>
+          <a:p>
+            <a:r>
+              <a:rPr sz="2000" b="0">
+                <a:latin typeface="Arial"/>
+              </a:rPr>
+              <a:t>→ Вводит запрос</a:t>
+            </a:r>
+          </a:p>
+          <a:p>
+            <a:r>
+              <a:rPr sz="2000" b="0">
+                <a:latin typeface="Arial"/>
+              </a:rPr>
+              <a:t>→ Получает ответ от LLM</a:t>
+            </a:r>
+          </a:p>
+          <a:p>
+            <a:r>
+              <a:rPr sz="2000" b="0">
+                <a:latin typeface="Arial"/>
+              </a:rPr>
+              <a:t>→ Копирует ответ при необходимости</a:t>
+            </a:r>
+          </a:p>
+          <a:p/>
+          <a:p>
+            <a:r>
+              <a:rPr sz="2000" b="0">
+                <a:latin typeface="Arial"/>
+              </a:rPr>
+              <a:t>Система:</a:t>
+            </a:r>
+          </a:p>
+          <a:p>
+            <a:r>
+              <a:rPr sz="2000" b="0">
+                <a:latin typeface="Arial"/>
+              </a:rPr>
+              <a:t>→ Отправляет запрос в Ollama</a:t>
+            </a:r>
+          </a:p>
+          <a:p>
+            <a:r>
+              <a:rPr sz="2000" b="0">
+                <a:latin typeface="Arial"/>
+              </a:rPr>
+              <a:t>→ Получает ответ</a:t>
+            </a:r>
+          </a:p>
+          <a:p>
+            <a:r>
+              <a:rPr sz="2000" b="0">
+                <a:latin typeface="Arial"/>
+              </a:rPr>
+              <a:t>→ Отображает результат в чате</a:t>
+            </a:r>
+          </a:p>
+        </p:txBody>
+      </p:sp>
+    </p:spTree>
+  </p:cSld>
+  <p:clrMapOvr>
+    <a:masterClrMapping/>
+  </p:clrMapOvr>
+</p:sld>
+</file>
+
+<file path=ppt/slides/slide8.xml><?xml version="1.0" encoding="utf-8"?>
+<p:sld xmlns:a="http://schemas.openxmlformats.org/drawingml/2006/main" xmlns:p="http://schemas.openxmlformats.org/presentationml/2006/main" xmlns:r="http://schemas.openxmlformats.org/officeDocument/2006/relationships">
+  <p:cSld>
+    <p:spTree>
+      <p:nvGrpSpPr>
+        <p:cNvPr id="1" name=""/>
+        <p:cNvGrpSpPr/>
+        <p:nvPr/>
+      </p:nvGrpSpPr>
+      <p:grpSpPr/>
+      <p:sp>
+        <p:nvSpPr>
+          <p:cNvPr id="2" name="Title 1"/>
+          <p:cNvSpPr>
+            <a:spLocks noGrp="1"/>
+          </p:cNvSpPr>
+          <p:nvPr>
+            <p:ph type="title"/>
+          </p:nvPr>
+        </p:nvSpPr>
+        <p:spPr/>
+        <p:txBody>
+          <a:bodyPr/>
+          <a:lstStyle/>
+          <a:p>
+            <a:r>
+              <a:t>Пример интерфейса</a:t>
+            </a:r>
+          </a:p>
+        </p:txBody>
+      </p:sp>
+      <p:sp>
+        <p:nvSpPr>
+          <p:cNvPr id="3" name="Content Placeholder 2"/>
+          <p:cNvSpPr>
+            <a:spLocks noGrp="1"/>
+          </p:cNvSpPr>
+          <p:nvPr>
+            <p:ph idx="1"/>
+          </p:nvPr>
+        </p:nvSpPr>
+        <p:spPr/>
+        <p:txBody>
+          <a:bodyPr/>
+          <a:lstStyle/>
+          <a:p>
+            <a:r>
+              <a:rPr sz="2000" b="0">
+                <a:latin typeface="Arial"/>
+              </a:rPr>
+              <a:t>* Вверху: логин</a:t>
+            </a:r>
+          </a:p>
+          <a:p>
+            <a:r>
+              <a:rPr sz="2000" b="0">
+                <a:latin typeface="Arial"/>
+              </a:rPr>
+              <a:t>* Центр: чат с подписями и прокруткой</a:t>
+            </a:r>
+          </a:p>
+          <a:p>
+            <a:r>
+              <a:rPr sz="2000" b="0">
+                <a:latin typeface="Arial"/>
+              </a:rPr>
+              <a:t>* Внизу: поле ввода + кнопка "Отправить"</a:t>
+            </a:r>
+          </a:p>
+          <a:p>
+            <a:r>
+              <a:rPr sz="2000" b="0">
+                <a:latin typeface="Arial"/>
+              </a:rPr>
+              <a:t>* Справа от каждого ответа — кнопка "Копировать"</a:t>
+            </a:r>
+          </a:p>
+        </p:txBody>
+      </p:sp>
+    </p:spTree>
+  </p:cSld>
+  <p:clrMapOvr>
+    <a:masterClrMapping/>
+  </p:clrMapOvr>
+</p:sld>
+</file>
+
+<file path=ppt/slides/slide9.xml><?xml version="1.0" encoding="utf-8"?>
+<p:sld xmlns:a="http://schemas.openxmlformats.org/drawingml/2006/main" xmlns:p="http://schemas.openxmlformats.org/presentationml/2006/main" xmlns:r="http://schemas.openxmlformats.org/officeDocument/2006/relationships">
+  <p:cSld>
+    <p:spTree>
+      <p:nvGrpSpPr>
+        <p:cNvPr id="1" name=""/>
+        <p:cNvGrpSpPr/>
+        <p:nvPr/>
+      </p:nvGrpSpPr>
+      <p:grpSpPr/>
+      <p:sp>
+        <p:nvSpPr>
+          <p:cNvPr id="2" name="Title 1"/>
+          <p:cNvSpPr>
+            <a:spLocks noGrp="1"/>
+          </p:cNvSpPr>
+          <p:nvPr>
+            <p:ph type="title"/>
+          </p:nvPr>
+        </p:nvSpPr>
+        <p:spPr/>
+        <p:txBody>
+          <a:bodyPr/>
+          <a:lstStyle/>
+          <a:p>
+            <a:r>
               <a:t>Заключение</a:t>
             </a:r>
           </a:p>
@@ -3515,17 +3938,26 @@
           <a:lstStyle/>
           <a:p>
             <a:r>
-              <a:t>Приложение позволяет удобно использовать локальную LLM</a:t>
-            </a:r>
-          </a:p>
-          <a:p>
-            <a:r>
-              <a:t>Не требует установки дополнительных инструментов</a:t>
-            </a:r>
-          </a:p>
-          <a:p>
-            <a:r>
-              <a:t>Возможность расширения (например, добавление истории, голосового ввода и т.д.)</a:t>
+              <a:rPr sz="2000" b="0">
+                <a:latin typeface="Arial"/>
+              </a:rPr>
+              <a:t>* Приложение позволяет удобно использовать локальную LLM</a:t>
+            </a:r>
+          </a:p>
+          <a:p>
+            <a:r>
+              <a:rPr sz="2000" b="0">
+                <a:latin typeface="Arial"/>
+              </a:rPr>
+              <a:t>* Не требует установки дополнительных инструментов</a:t>
+            </a:r>
+          </a:p>
+          <a:p>
+            <a:r>
+              <a:rPr sz="2000" b="0">
+                <a:latin typeface="Arial"/>
+              </a:rPr>
+              <a:t>* Возможность расширения (например, добавление истории, голосового ввода и т.д.)</a:t>
             </a:r>
           </a:p>
         </p:txBody>

</xml_diff>